<commit_message>
miniSpring09: - 支持 Bean 作用域设置：singleton/prototype - 支持 BeanFactory
</commit_message>
<xml_diff>
--- a/spring执行流程.pptx
+++ b/spring执行流程.pptx
@@ -12,6 +12,7 @@
     <p:sldId id="260" r:id="rId6"/>
     <p:sldId id="261" r:id="rId7"/>
     <p:sldId id="262" r:id="rId8"/>
+    <p:sldId id="263" r:id="rId9"/>
   </p:sldIdLst>
   <p:sldSz cx="12192000" cy="6858000"/>
   <p:notesSz cx="6858000" cy="9144000"/>
@@ -265,7 +266,7 @@
           <a:p>
             <a:fld id="{4CA57D55-CFD9-4D7E-B60B-1725E00699FD}" type="datetimeFigureOut">
               <a:rPr lang="zh-CN" altLang="en-US" smtClean="0"/>
-              <a:t>2021/9/19</a:t>
+              <a:t>2021/9/20</a:t>
             </a:fld>
             <a:endParaRPr lang="zh-CN" altLang="en-US"/>
           </a:p>
@@ -463,7 +464,7 @@
           <a:p>
             <a:fld id="{4CA57D55-CFD9-4D7E-B60B-1725E00699FD}" type="datetimeFigureOut">
               <a:rPr lang="zh-CN" altLang="en-US" smtClean="0"/>
-              <a:t>2021/9/19</a:t>
+              <a:t>2021/9/20</a:t>
             </a:fld>
             <a:endParaRPr lang="zh-CN" altLang="en-US"/>
           </a:p>
@@ -671,7 +672,7 @@
           <a:p>
             <a:fld id="{4CA57D55-CFD9-4D7E-B60B-1725E00699FD}" type="datetimeFigureOut">
               <a:rPr lang="zh-CN" altLang="en-US" smtClean="0"/>
-              <a:t>2021/9/19</a:t>
+              <a:t>2021/9/20</a:t>
             </a:fld>
             <a:endParaRPr lang="zh-CN" altLang="en-US"/>
           </a:p>
@@ -869,7 +870,7 @@
           <a:p>
             <a:fld id="{4CA57D55-CFD9-4D7E-B60B-1725E00699FD}" type="datetimeFigureOut">
               <a:rPr lang="zh-CN" altLang="en-US" smtClean="0"/>
-              <a:t>2021/9/19</a:t>
+              <a:t>2021/9/20</a:t>
             </a:fld>
             <a:endParaRPr lang="zh-CN" altLang="en-US"/>
           </a:p>
@@ -1144,7 +1145,7 @@
           <a:p>
             <a:fld id="{4CA57D55-CFD9-4D7E-B60B-1725E00699FD}" type="datetimeFigureOut">
               <a:rPr lang="zh-CN" altLang="en-US" smtClean="0"/>
-              <a:t>2021/9/19</a:t>
+              <a:t>2021/9/20</a:t>
             </a:fld>
             <a:endParaRPr lang="zh-CN" altLang="en-US"/>
           </a:p>
@@ -1409,7 +1410,7 @@
           <a:p>
             <a:fld id="{4CA57D55-CFD9-4D7E-B60B-1725E00699FD}" type="datetimeFigureOut">
               <a:rPr lang="zh-CN" altLang="en-US" smtClean="0"/>
-              <a:t>2021/9/19</a:t>
+              <a:t>2021/9/20</a:t>
             </a:fld>
             <a:endParaRPr lang="zh-CN" altLang="en-US"/>
           </a:p>
@@ -1821,7 +1822,7 @@
           <a:p>
             <a:fld id="{4CA57D55-CFD9-4D7E-B60B-1725E00699FD}" type="datetimeFigureOut">
               <a:rPr lang="zh-CN" altLang="en-US" smtClean="0"/>
-              <a:t>2021/9/19</a:t>
+              <a:t>2021/9/20</a:t>
             </a:fld>
             <a:endParaRPr lang="zh-CN" altLang="en-US"/>
           </a:p>
@@ -1962,7 +1963,7 @@
           <a:p>
             <a:fld id="{4CA57D55-CFD9-4D7E-B60B-1725E00699FD}" type="datetimeFigureOut">
               <a:rPr lang="zh-CN" altLang="en-US" smtClean="0"/>
-              <a:t>2021/9/19</a:t>
+              <a:t>2021/9/20</a:t>
             </a:fld>
             <a:endParaRPr lang="zh-CN" altLang="en-US"/>
           </a:p>
@@ -2075,7 +2076,7 @@
           <a:p>
             <a:fld id="{4CA57D55-CFD9-4D7E-B60B-1725E00699FD}" type="datetimeFigureOut">
               <a:rPr lang="zh-CN" altLang="en-US" smtClean="0"/>
-              <a:t>2021/9/19</a:t>
+              <a:t>2021/9/20</a:t>
             </a:fld>
             <a:endParaRPr lang="zh-CN" altLang="en-US"/>
           </a:p>
@@ -2386,7 +2387,7 @@
           <a:p>
             <a:fld id="{4CA57D55-CFD9-4D7E-B60B-1725E00699FD}" type="datetimeFigureOut">
               <a:rPr lang="zh-CN" altLang="en-US" smtClean="0"/>
-              <a:t>2021/9/19</a:t>
+              <a:t>2021/9/20</a:t>
             </a:fld>
             <a:endParaRPr lang="zh-CN" altLang="en-US"/>
           </a:p>
@@ -2674,7 +2675,7 @@
           <a:p>
             <a:fld id="{4CA57D55-CFD9-4D7E-B60B-1725E00699FD}" type="datetimeFigureOut">
               <a:rPr lang="zh-CN" altLang="en-US" smtClean="0"/>
-              <a:t>2021/9/19</a:t>
+              <a:t>2021/9/20</a:t>
             </a:fld>
             <a:endParaRPr lang="zh-CN" altLang="en-US"/>
           </a:p>
@@ -2915,7 +2916,7 @@
           <a:p>
             <a:fld id="{4CA57D55-CFD9-4D7E-B60B-1725E00699FD}" type="datetimeFigureOut">
               <a:rPr lang="zh-CN" altLang="en-US" smtClean="0"/>
-              <a:t>2021/9/19</a:t>
+              <a:t>2021/9/20</a:t>
             </a:fld>
             <a:endParaRPr lang="zh-CN" altLang="en-US"/>
           </a:p>
@@ -9893,6 +9894,1048 @@
 </p:sld>
 </file>
 
+<file path=ppt/slides/slide8.xml><?xml version="1.0" encoding="utf-8"?>
+<p:sld xmlns:a="http://schemas.openxmlformats.org/drawingml/2006/main" xmlns:r="http://schemas.openxmlformats.org/officeDocument/2006/relationships" xmlns:p="http://schemas.openxmlformats.org/presentationml/2006/main">
+  <p:cSld>
+    <p:bg>
+      <p:bgPr>
+        <a:solidFill>
+          <a:srgbClr val="2B2B2B"/>
+        </a:solidFill>
+        <a:effectLst/>
+      </p:bgPr>
+    </p:bg>
+    <p:spTree>
+      <p:nvGrpSpPr>
+        <p:cNvPr id="1" name=""/>
+        <p:cNvGrpSpPr/>
+        <p:nvPr/>
+      </p:nvGrpSpPr>
+      <p:grpSpPr>
+        <a:xfrm>
+          <a:off x="0" y="0"/>
+          <a:ext cx="0" cy="0"/>
+          <a:chOff x="0" y="0"/>
+          <a:chExt cx="0" cy="0"/>
+        </a:xfrm>
+      </p:grpSpPr>
+      <p:pic>
+        <p:nvPicPr>
+          <p:cNvPr id="5" name="图片 4">
+            <a:extLst>
+              <a:ext uri="{FF2B5EF4-FFF2-40B4-BE49-F238E27FC236}">
+                <a16:creationId xmlns:a16="http://schemas.microsoft.com/office/drawing/2014/main" id="{78497403-E37C-42F6-ACAB-15422E5D44E5}"/>
+              </a:ext>
+            </a:extLst>
+          </p:cNvPr>
+          <p:cNvPicPr>
+            <a:picLocks noChangeAspect="1"/>
+          </p:cNvPicPr>
+          <p:nvPr/>
+        </p:nvPicPr>
+        <p:blipFill>
+          <a:blip r:embed="rId2"/>
+          <a:stretch>
+            <a:fillRect/>
+          </a:stretch>
+        </p:blipFill>
+        <p:spPr>
+          <a:xfrm>
+            <a:off x="1922417" y="0"/>
+            <a:ext cx="8347165" cy="6858000"/>
+          </a:xfrm>
+          <a:prstGeom prst="rect">
+            <a:avLst/>
+          </a:prstGeom>
+        </p:spPr>
+      </p:pic>
+      <p:grpSp>
+        <p:nvGrpSpPr>
+          <p:cNvPr id="6" name="组合 5">
+            <a:extLst>
+              <a:ext uri="{FF2B5EF4-FFF2-40B4-BE49-F238E27FC236}">
+                <a16:creationId xmlns:a16="http://schemas.microsoft.com/office/drawing/2014/main" id="{1FF8CD39-CF35-40ED-AED2-07F337F70261}"/>
+              </a:ext>
+            </a:extLst>
+          </p:cNvPr>
+          <p:cNvGrpSpPr/>
+          <p:nvPr/>
+        </p:nvGrpSpPr>
+        <p:grpSpPr>
+          <a:xfrm>
+            <a:off x="88900" y="6426201"/>
+            <a:ext cx="1987551" cy="303104"/>
+            <a:chOff x="5812039" y="1043610"/>
+            <a:chExt cx="1667144" cy="892471"/>
+          </a:xfrm>
+        </p:grpSpPr>
+        <p:sp>
+          <p:nvSpPr>
+            <p:cNvPr id="7" name="矩形 6">
+              <a:extLst>
+                <a:ext uri="{FF2B5EF4-FFF2-40B4-BE49-F238E27FC236}">
+                  <a16:creationId xmlns:a16="http://schemas.microsoft.com/office/drawing/2014/main" id="{76C5944A-BB5C-4A67-B874-B540D8AC3DA4}"/>
+                </a:ext>
+              </a:extLst>
+            </p:cNvPr>
+            <p:cNvSpPr/>
+            <p:nvPr/>
+          </p:nvSpPr>
+          <p:spPr>
+            <a:xfrm>
+              <a:off x="5812039" y="1043610"/>
+              <a:ext cx="1667144" cy="892471"/>
+            </a:xfrm>
+            <a:prstGeom prst="rect">
+              <a:avLst/>
+            </a:prstGeom>
+            <a:noFill/>
+            <a:ln w="19050">
+              <a:solidFill>
+                <a:schemeClr val="tx1">
+                  <a:lumMod val="50000"/>
+                  <a:lumOff val="50000"/>
+                </a:schemeClr>
+              </a:solidFill>
+            </a:ln>
+          </p:spPr>
+          <p:style>
+            <a:lnRef idx="2">
+              <a:schemeClr val="accent1">
+                <a:shade val="50000"/>
+              </a:schemeClr>
+            </a:lnRef>
+            <a:fillRef idx="1">
+              <a:schemeClr val="accent1"/>
+            </a:fillRef>
+            <a:effectRef idx="0">
+              <a:schemeClr val="accent1"/>
+            </a:effectRef>
+            <a:fontRef idx="minor">
+              <a:schemeClr val="lt1"/>
+            </a:fontRef>
+          </p:style>
+          <p:txBody>
+            <a:bodyPr rtlCol="0" anchor="ctr"/>
+            <a:lstStyle/>
+            <a:p>
+              <a:pPr algn="ctr"/>
+              <a:endParaRPr lang="zh-CN" altLang="en-US"/>
+            </a:p>
+          </p:txBody>
+        </p:sp>
+        <p:sp>
+          <p:nvSpPr>
+            <p:cNvPr id="8" name="文本框 7">
+              <a:extLst>
+                <a:ext uri="{FF2B5EF4-FFF2-40B4-BE49-F238E27FC236}">
+                  <a16:creationId xmlns:a16="http://schemas.microsoft.com/office/drawing/2014/main" id="{6FC017AC-047B-4219-9945-D198A4C84BA4}"/>
+                </a:ext>
+              </a:extLst>
+            </p:cNvPr>
+            <p:cNvSpPr txBox="1"/>
+            <p:nvPr/>
+          </p:nvSpPr>
+          <p:spPr>
+            <a:xfrm>
+              <a:off x="5812039" y="1118625"/>
+              <a:ext cx="1592574" cy="724982"/>
+            </a:xfrm>
+            <a:prstGeom prst="rect">
+              <a:avLst/>
+            </a:prstGeom>
+            <a:noFill/>
+            <a:ln w="9525">
+              <a:noFill/>
+            </a:ln>
+          </p:spPr>
+          <p:txBody>
+            <a:bodyPr wrap="square" rtlCol="0">
+              <a:spAutoFit/>
+            </a:bodyPr>
+            <a:lstStyle/>
+            <a:p>
+              <a:r>
+                <a:rPr lang="zh-CN" altLang="en-US" sz="1000" dirty="0">
+                  <a:solidFill>
+                    <a:schemeClr val="bg2">
+                      <a:lumMod val="90000"/>
+                    </a:schemeClr>
+                  </a:solidFill>
+                </a:rPr>
+                <a:t>增加  </a:t>
+              </a:r>
+              <a:r>
+                <a:rPr lang="en-US" altLang="zh-CN" sz="1000" dirty="0">
+                  <a:solidFill>
+                    <a:schemeClr val="bg2">
+                      <a:lumMod val="90000"/>
+                    </a:schemeClr>
+                  </a:solidFill>
+                </a:rPr>
+                <a:t>scope </a:t>
+              </a:r>
+              <a:r>
+                <a:rPr lang="zh-CN" altLang="en-US" sz="1000" dirty="0">
+                  <a:solidFill>
+                    <a:schemeClr val="bg2">
+                      <a:lumMod val="90000"/>
+                    </a:schemeClr>
+                  </a:solidFill>
+                </a:rPr>
+                <a:t>属性确定作用域</a:t>
+              </a:r>
+            </a:p>
+          </p:txBody>
+        </p:sp>
+      </p:grpSp>
+      <p:cxnSp>
+        <p:nvCxnSpPr>
+          <p:cNvPr id="10" name="连接符: 肘形 9">
+            <a:extLst>
+              <a:ext uri="{FF2B5EF4-FFF2-40B4-BE49-F238E27FC236}">
+                <a16:creationId xmlns:a16="http://schemas.microsoft.com/office/drawing/2014/main" id="{62AC3FDB-E475-437E-BD7A-B33691BC59CE}"/>
+              </a:ext>
+            </a:extLst>
+          </p:cNvPr>
+          <p:cNvCxnSpPr>
+            <a:cxnSpLocks/>
+          </p:cNvCxnSpPr>
+          <p:nvPr/>
+        </p:nvCxnSpPr>
+        <p:spPr>
+          <a:xfrm>
+            <a:off x="2076451" y="6451678"/>
+            <a:ext cx="2768599" cy="139622"/>
+          </a:xfrm>
+          <a:prstGeom prst="bentConnector3">
+            <a:avLst>
+              <a:gd name="adj1" fmla="val 100230"/>
+            </a:avLst>
+          </a:prstGeom>
+          <a:ln w="12700">
+            <a:solidFill>
+              <a:srgbClr val="8F8F8F"/>
+            </a:solidFill>
+            <a:tailEnd type="triangle"/>
+          </a:ln>
+        </p:spPr>
+        <p:style>
+          <a:lnRef idx="1">
+            <a:schemeClr val="accent1"/>
+          </a:lnRef>
+          <a:fillRef idx="0">
+            <a:schemeClr val="accent1"/>
+          </a:fillRef>
+          <a:effectRef idx="0">
+            <a:schemeClr val="accent1"/>
+          </a:effectRef>
+          <a:fontRef idx="minor">
+            <a:schemeClr val="tx1"/>
+          </a:fontRef>
+        </p:style>
+      </p:cxnSp>
+      <p:grpSp>
+        <p:nvGrpSpPr>
+          <p:cNvPr id="18" name="组合 17">
+            <a:extLst>
+              <a:ext uri="{FF2B5EF4-FFF2-40B4-BE49-F238E27FC236}">
+                <a16:creationId xmlns:a16="http://schemas.microsoft.com/office/drawing/2014/main" id="{4C7B580D-FF0B-4ABD-A594-5F7BF51D4B0B}"/>
+              </a:ext>
+            </a:extLst>
+          </p:cNvPr>
+          <p:cNvGrpSpPr/>
+          <p:nvPr/>
+        </p:nvGrpSpPr>
+        <p:grpSpPr>
+          <a:xfrm>
+            <a:off x="5108574" y="1447800"/>
+            <a:ext cx="2063749" cy="584239"/>
+            <a:chOff x="5812039" y="1043610"/>
+            <a:chExt cx="1667144" cy="892471"/>
+          </a:xfrm>
+        </p:grpSpPr>
+        <p:sp>
+          <p:nvSpPr>
+            <p:cNvPr id="19" name="矩形 18">
+              <a:extLst>
+                <a:ext uri="{FF2B5EF4-FFF2-40B4-BE49-F238E27FC236}">
+                  <a16:creationId xmlns:a16="http://schemas.microsoft.com/office/drawing/2014/main" id="{DEFC0110-092B-469E-B7CA-2F69D2AA37A0}"/>
+                </a:ext>
+              </a:extLst>
+            </p:cNvPr>
+            <p:cNvSpPr/>
+            <p:nvPr/>
+          </p:nvSpPr>
+          <p:spPr>
+            <a:xfrm>
+              <a:off x="5812039" y="1043610"/>
+              <a:ext cx="1667144" cy="892471"/>
+            </a:xfrm>
+            <a:prstGeom prst="rect">
+              <a:avLst/>
+            </a:prstGeom>
+            <a:noFill/>
+            <a:ln w="19050">
+              <a:solidFill>
+                <a:schemeClr val="tx1">
+                  <a:lumMod val="50000"/>
+                  <a:lumOff val="50000"/>
+                </a:schemeClr>
+              </a:solidFill>
+            </a:ln>
+          </p:spPr>
+          <p:style>
+            <a:lnRef idx="2">
+              <a:schemeClr val="accent1">
+                <a:shade val="50000"/>
+              </a:schemeClr>
+            </a:lnRef>
+            <a:fillRef idx="1">
+              <a:schemeClr val="accent1"/>
+            </a:fillRef>
+            <a:effectRef idx="0">
+              <a:schemeClr val="accent1"/>
+            </a:effectRef>
+            <a:fontRef idx="minor">
+              <a:schemeClr val="lt1"/>
+            </a:fontRef>
+          </p:style>
+          <p:txBody>
+            <a:bodyPr rtlCol="0" anchor="ctr"/>
+            <a:lstStyle/>
+            <a:p>
+              <a:pPr algn="ctr"/>
+              <a:endParaRPr lang="zh-CN" altLang="en-US" dirty="0"/>
+            </a:p>
+          </p:txBody>
+        </p:sp>
+        <p:sp>
+          <p:nvSpPr>
+            <p:cNvPr id="20" name="文本框 19">
+              <a:extLst>
+                <a:ext uri="{FF2B5EF4-FFF2-40B4-BE49-F238E27FC236}">
+                  <a16:creationId xmlns:a16="http://schemas.microsoft.com/office/drawing/2014/main" id="{A256C921-C350-4B66-A218-570B4F90DE83}"/>
+                </a:ext>
+              </a:extLst>
+            </p:cNvPr>
+            <p:cNvSpPr txBox="1"/>
+            <p:nvPr/>
+          </p:nvSpPr>
+          <p:spPr>
+            <a:xfrm>
+              <a:off x="5812039" y="1118624"/>
+              <a:ext cx="1592574" cy="310675"/>
+            </a:xfrm>
+            <a:prstGeom prst="rect">
+              <a:avLst/>
+            </a:prstGeom>
+            <a:noFill/>
+            <a:ln w="9525">
+              <a:noFill/>
+            </a:ln>
+          </p:spPr>
+          <p:txBody>
+            <a:bodyPr wrap="square" rtlCol="0">
+              <a:spAutoFit/>
+            </a:bodyPr>
+            <a:lstStyle/>
+            <a:p>
+              <a:r>
+                <a:rPr lang="zh-CN" altLang="en-US" sz="1000" dirty="0">
+                  <a:solidFill>
+                    <a:schemeClr val="bg2">
+                      <a:lumMod val="90000"/>
+                    </a:schemeClr>
+                  </a:solidFill>
+                </a:rPr>
+                <a:t>对于单例 </a:t>
+              </a:r>
+              <a:r>
+                <a:rPr lang="en-US" altLang="zh-CN" sz="1000" dirty="0">
+                  <a:solidFill>
+                    <a:schemeClr val="bg2">
+                      <a:lumMod val="90000"/>
+                    </a:schemeClr>
+                  </a:solidFill>
+                </a:rPr>
+                <a:t>Bean </a:t>
+              </a:r>
+              <a:r>
+                <a:rPr lang="zh-CN" altLang="en-US" sz="1000" dirty="0">
+                  <a:solidFill>
+                    <a:schemeClr val="bg2">
+                      <a:lumMod val="90000"/>
+                    </a:schemeClr>
+                  </a:solidFill>
+                </a:rPr>
+                <a:t>进行注册</a:t>
+              </a:r>
+              <a:br>
+                <a:rPr lang="en-US" altLang="zh-CN" sz="1000" dirty="0">
+                  <a:solidFill>
+                    <a:schemeClr val="bg2">
+                      <a:lumMod val="90000"/>
+                    </a:schemeClr>
+                  </a:solidFill>
+                </a:rPr>
+              </a:br>
+              <a:r>
+                <a:rPr lang="zh-CN" altLang="en-US" sz="1000" dirty="0">
+                  <a:solidFill>
+                    <a:schemeClr val="bg2">
+                      <a:lumMod val="90000"/>
+                    </a:schemeClr>
+                  </a:solidFill>
+                </a:rPr>
+                <a:t>对于非单例 </a:t>
+              </a:r>
+              <a:r>
+                <a:rPr lang="en-US" altLang="zh-CN" sz="1000" dirty="0">
+                  <a:solidFill>
+                    <a:schemeClr val="bg2">
+                      <a:lumMod val="90000"/>
+                    </a:schemeClr>
+                  </a:solidFill>
+                </a:rPr>
+                <a:t>Bean </a:t>
+              </a:r>
+              <a:r>
+                <a:rPr lang="zh-CN" altLang="en-US" sz="1000" dirty="0">
+                  <a:solidFill>
+                    <a:schemeClr val="bg2">
+                      <a:lumMod val="90000"/>
+                    </a:schemeClr>
+                  </a:solidFill>
+                </a:rPr>
+                <a:t>不执行销毁</a:t>
+              </a:r>
+            </a:p>
+          </p:txBody>
+        </p:sp>
+      </p:grpSp>
+      <p:grpSp>
+        <p:nvGrpSpPr>
+          <p:cNvPr id="21" name="组合 20">
+            <a:extLst>
+              <a:ext uri="{FF2B5EF4-FFF2-40B4-BE49-F238E27FC236}">
+                <a16:creationId xmlns:a16="http://schemas.microsoft.com/office/drawing/2014/main" id="{40063CFF-6008-4485-B60B-149F2D4474E8}"/>
+              </a:ext>
+            </a:extLst>
+          </p:cNvPr>
+          <p:cNvGrpSpPr/>
+          <p:nvPr/>
+        </p:nvGrpSpPr>
+        <p:grpSpPr>
+          <a:xfrm>
+            <a:off x="571500" y="3213948"/>
+            <a:ext cx="3886199" cy="367451"/>
+            <a:chOff x="5812039" y="1043610"/>
+            <a:chExt cx="1667144" cy="892471"/>
+          </a:xfrm>
+        </p:grpSpPr>
+        <p:sp>
+          <p:nvSpPr>
+            <p:cNvPr id="22" name="矩形 21">
+              <a:extLst>
+                <a:ext uri="{FF2B5EF4-FFF2-40B4-BE49-F238E27FC236}">
+                  <a16:creationId xmlns:a16="http://schemas.microsoft.com/office/drawing/2014/main" id="{7DC67DAF-A211-445A-8B96-9C1011292E23}"/>
+                </a:ext>
+              </a:extLst>
+            </p:cNvPr>
+            <p:cNvSpPr/>
+            <p:nvPr/>
+          </p:nvSpPr>
+          <p:spPr>
+            <a:xfrm>
+              <a:off x="5812039" y="1043610"/>
+              <a:ext cx="1667144" cy="892471"/>
+            </a:xfrm>
+            <a:prstGeom prst="rect">
+              <a:avLst/>
+            </a:prstGeom>
+            <a:noFill/>
+            <a:ln w="19050">
+              <a:solidFill>
+                <a:schemeClr val="tx1">
+                  <a:lumMod val="50000"/>
+                  <a:lumOff val="50000"/>
+                </a:schemeClr>
+              </a:solidFill>
+            </a:ln>
+          </p:spPr>
+          <p:style>
+            <a:lnRef idx="2">
+              <a:schemeClr val="accent1">
+                <a:shade val="50000"/>
+              </a:schemeClr>
+            </a:lnRef>
+            <a:fillRef idx="1">
+              <a:schemeClr val="accent1"/>
+            </a:fillRef>
+            <a:effectRef idx="0">
+              <a:schemeClr val="accent1"/>
+            </a:effectRef>
+            <a:fontRef idx="minor">
+              <a:schemeClr val="lt1"/>
+            </a:fontRef>
+          </p:style>
+          <p:txBody>
+            <a:bodyPr rtlCol="0" anchor="ctr"/>
+            <a:lstStyle/>
+            <a:p>
+              <a:pPr algn="ctr"/>
+              <a:endParaRPr lang="zh-CN" altLang="en-US"/>
+            </a:p>
+          </p:txBody>
+        </p:sp>
+        <p:sp>
+          <p:nvSpPr>
+            <p:cNvPr id="23" name="文本框 22">
+              <a:extLst>
+                <a:ext uri="{FF2B5EF4-FFF2-40B4-BE49-F238E27FC236}">
+                  <a16:creationId xmlns:a16="http://schemas.microsoft.com/office/drawing/2014/main" id="{61ADC10A-88B5-4B41-977E-65366E6FA1ED}"/>
+                </a:ext>
+              </a:extLst>
+            </p:cNvPr>
+            <p:cNvSpPr txBox="1"/>
+            <p:nvPr/>
+          </p:nvSpPr>
+          <p:spPr>
+            <a:xfrm>
+              <a:off x="5812039" y="1118624"/>
+              <a:ext cx="1592574" cy="598026"/>
+            </a:xfrm>
+            <a:prstGeom prst="rect">
+              <a:avLst/>
+            </a:prstGeom>
+            <a:noFill/>
+            <a:ln w="9525">
+              <a:noFill/>
+            </a:ln>
+          </p:spPr>
+          <p:txBody>
+            <a:bodyPr wrap="square" rtlCol="0">
+              <a:spAutoFit/>
+            </a:bodyPr>
+            <a:lstStyle/>
+            <a:p>
+              <a:r>
+                <a:rPr lang="zh-CN" altLang="en-US" sz="1000" dirty="0">
+                  <a:solidFill>
+                    <a:schemeClr val="bg2">
+                      <a:lumMod val="90000"/>
+                    </a:schemeClr>
+                  </a:solidFill>
+                </a:rPr>
+                <a:t>支持在</a:t>
+              </a:r>
+              <a:r>
+                <a:rPr lang="en-US" altLang="zh-CN" sz="1000" dirty="0">
+                  <a:solidFill>
+                    <a:schemeClr val="bg2">
+                      <a:lumMod val="90000"/>
+                    </a:schemeClr>
+                  </a:solidFill>
+                </a:rPr>
+                <a:t>xml</a:t>
+              </a:r>
+              <a:r>
+                <a:rPr lang="zh-CN" altLang="en-US" sz="1000" dirty="0">
+                  <a:solidFill>
+                    <a:schemeClr val="bg2">
+                      <a:lumMod val="90000"/>
+                    </a:schemeClr>
+                  </a:solidFill>
+                </a:rPr>
+                <a:t>中配置 </a:t>
+              </a:r>
+              <a:r>
+                <a:rPr lang="en-US" altLang="zh-CN" sz="1000" dirty="0">
+                  <a:solidFill>
+                    <a:schemeClr val="bg2">
+                      <a:lumMod val="90000"/>
+                    </a:schemeClr>
+                  </a:solidFill>
+                </a:rPr>
+                <a:t>Bean </a:t>
+              </a:r>
+              <a:r>
+                <a:rPr lang="zh-CN" altLang="en-US" sz="1000" dirty="0">
+                  <a:solidFill>
+                    <a:schemeClr val="bg2">
+                      <a:lumMod val="90000"/>
+                    </a:schemeClr>
+                  </a:solidFill>
+                </a:rPr>
+                <a:t>的作用域</a:t>
+              </a:r>
+            </a:p>
+          </p:txBody>
+        </p:sp>
+      </p:grpSp>
+      <p:grpSp>
+        <p:nvGrpSpPr>
+          <p:cNvPr id="26" name="组合 25">
+            <a:extLst>
+              <a:ext uri="{FF2B5EF4-FFF2-40B4-BE49-F238E27FC236}">
+                <a16:creationId xmlns:a16="http://schemas.microsoft.com/office/drawing/2014/main" id="{4DE36025-3008-423D-B0A6-42A171F7117E}"/>
+              </a:ext>
+            </a:extLst>
+          </p:cNvPr>
+          <p:cNvGrpSpPr/>
+          <p:nvPr/>
+        </p:nvGrpSpPr>
+        <p:grpSpPr>
+          <a:xfrm>
+            <a:off x="8626474" y="1381050"/>
+            <a:ext cx="2312796" cy="441400"/>
+            <a:chOff x="5812039" y="1043610"/>
+            <a:chExt cx="1767705" cy="892471"/>
+          </a:xfrm>
+        </p:grpSpPr>
+        <p:sp>
+          <p:nvSpPr>
+            <p:cNvPr id="27" name="矩形 26">
+              <a:extLst>
+                <a:ext uri="{FF2B5EF4-FFF2-40B4-BE49-F238E27FC236}">
+                  <a16:creationId xmlns:a16="http://schemas.microsoft.com/office/drawing/2014/main" id="{B51EAD29-DAD7-4149-B894-26635ADC7ADE}"/>
+                </a:ext>
+              </a:extLst>
+            </p:cNvPr>
+            <p:cNvSpPr/>
+            <p:nvPr/>
+          </p:nvSpPr>
+          <p:spPr>
+            <a:xfrm>
+              <a:off x="5812039" y="1043610"/>
+              <a:ext cx="1667144" cy="892471"/>
+            </a:xfrm>
+            <a:prstGeom prst="rect">
+              <a:avLst/>
+            </a:prstGeom>
+            <a:noFill/>
+            <a:ln w="19050">
+              <a:solidFill>
+                <a:schemeClr val="tx1">
+                  <a:lumMod val="50000"/>
+                  <a:lumOff val="50000"/>
+                </a:schemeClr>
+              </a:solidFill>
+            </a:ln>
+          </p:spPr>
+          <p:style>
+            <a:lnRef idx="2">
+              <a:schemeClr val="accent1">
+                <a:shade val="50000"/>
+              </a:schemeClr>
+            </a:lnRef>
+            <a:fillRef idx="1">
+              <a:schemeClr val="accent1"/>
+            </a:fillRef>
+            <a:effectRef idx="0">
+              <a:schemeClr val="accent1"/>
+            </a:effectRef>
+            <a:fontRef idx="minor">
+              <a:schemeClr val="lt1"/>
+            </a:fontRef>
+          </p:style>
+          <p:txBody>
+            <a:bodyPr rtlCol="0" anchor="ctr"/>
+            <a:lstStyle/>
+            <a:p>
+              <a:pPr algn="ctr"/>
+              <a:endParaRPr lang="zh-CN" altLang="en-US" dirty="0"/>
+            </a:p>
+          </p:txBody>
+        </p:sp>
+        <p:sp>
+          <p:nvSpPr>
+            <p:cNvPr id="28" name="文本框 27">
+              <a:extLst>
+                <a:ext uri="{FF2B5EF4-FFF2-40B4-BE49-F238E27FC236}">
+                  <a16:creationId xmlns:a16="http://schemas.microsoft.com/office/drawing/2014/main" id="{9FD079C3-4713-4DF5-AC1C-0949EB7F5CE0}"/>
+                </a:ext>
+              </a:extLst>
+            </p:cNvPr>
+            <p:cNvSpPr txBox="1"/>
+            <p:nvPr/>
+          </p:nvSpPr>
+          <p:spPr>
+            <a:xfrm>
+              <a:off x="6326500" y="1438244"/>
+              <a:ext cx="1253244" cy="497837"/>
+            </a:xfrm>
+            <a:prstGeom prst="rect">
+              <a:avLst/>
+            </a:prstGeom>
+            <a:noFill/>
+            <a:ln w="9525">
+              <a:noFill/>
+            </a:ln>
+          </p:spPr>
+          <p:txBody>
+            <a:bodyPr wrap="square" rtlCol="0">
+              <a:spAutoFit/>
+            </a:bodyPr>
+            <a:lstStyle/>
+            <a:p>
+              <a:r>
+                <a:rPr lang="zh-CN" altLang="en-US" sz="1000" dirty="0">
+                  <a:solidFill>
+                    <a:schemeClr val="bg2">
+                      <a:lumMod val="90000"/>
+                    </a:schemeClr>
+                  </a:solidFill>
+                </a:rPr>
+                <a:t>增加 </a:t>
+              </a:r>
+              <a:r>
+                <a:rPr lang="en-US" altLang="zh-CN" sz="1000" dirty="0">
+                  <a:solidFill>
+                    <a:schemeClr val="bg2">
+                      <a:lumMod val="90000"/>
+                    </a:schemeClr>
+                  </a:solidFill>
+                </a:rPr>
+                <a:t>BeanFactory</a:t>
+              </a:r>
+              <a:r>
+                <a:rPr lang="zh-CN" altLang="en-US" sz="1000" dirty="0">
+                  <a:solidFill>
+                    <a:schemeClr val="bg2">
+                      <a:lumMod val="90000"/>
+                    </a:schemeClr>
+                  </a:solidFill>
+                </a:rPr>
+                <a:t> 的支持</a:t>
+              </a:r>
+            </a:p>
+          </p:txBody>
+        </p:sp>
+      </p:grpSp>
+      <p:grpSp>
+        <p:nvGrpSpPr>
+          <p:cNvPr id="29" name="组合 28">
+            <a:extLst>
+              <a:ext uri="{FF2B5EF4-FFF2-40B4-BE49-F238E27FC236}">
+                <a16:creationId xmlns:a16="http://schemas.microsoft.com/office/drawing/2014/main" id="{9C805537-AEA0-4565-BC31-5FF3E8E0C97E}"/>
+              </a:ext>
+            </a:extLst>
+          </p:cNvPr>
+          <p:cNvGrpSpPr/>
+          <p:nvPr/>
+        </p:nvGrpSpPr>
+        <p:grpSpPr>
+          <a:xfrm>
+            <a:off x="7849442" y="1865245"/>
+            <a:ext cx="2900284" cy="400110"/>
+            <a:chOff x="5812039" y="1017384"/>
+            <a:chExt cx="1667144" cy="944923"/>
+          </a:xfrm>
+        </p:grpSpPr>
+        <p:sp>
+          <p:nvSpPr>
+            <p:cNvPr id="30" name="矩形 29">
+              <a:extLst>
+                <a:ext uri="{FF2B5EF4-FFF2-40B4-BE49-F238E27FC236}">
+                  <a16:creationId xmlns:a16="http://schemas.microsoft.com/office/drawing/2014/main" id="{8D4E0915-D0C8-4F1B-B9DC-6350EC29C899}"/>
+                </a:ext>
+              </a:extLst>
+            </p:cNvPr>
+            <p:cNvSpPr/>
+            <p:nvPr/>
+          </p:nvSpPr>
+          <p:spPr>
+            <a:xfrm>
+              <a:off x="5812039" y="1043610"/>
+              <a:ext cx="1667144" cy="892471"/>
+            </a:xfrm>
+            <a:prstGeom prst="rect">
+              <a:avLst/>
+            </a:prstGeom>
+            <a:noFill/>
+            <a:ln w="19050">
+              <a:solidFill>
+                <a:schemeClr val="tx1">
+                  <a:lumMod val="50000"/>
+                  <a:lumOff val="50000"/>
+                </a:schemeClr>
+              </a:solidFill>
+            </a:ln>
+          </p:spPr>
+          <p:style>
+            <a:lnRef idx="2">
+              <a:schemeClr val="accent1">
+                <a:shade val="50000"/>
+              </a:schemeClr>
+            </a:lnRef>
+            <a:fillRef idx="1">
+              <a:schemeClr val="accent1"/>
+            </a:fillRef>
+            <a:effectRef idx="0">
+              <a:schemeClr val="accent1"/>
+            </a:effectRef>
+            <a:fontRef idx="minor">
+              <a:schemeClr val="lt1"/>
+            </a:fontRef>
+          </p:style>
+          <p:txBody>
+            <a:bodyPr rtlCol="0" anchor="ctr"/>
+            <a:lstStyle/>
+            <a:p>
+              <a:pPr algn="ctr"/>
+              <a:endParaRPr lang="zh-CN" altLang="en-US" dirty="0"/>
+            </a:p>
+          </p:txBody>
+        </p:sp>
+        <p:sp>
+          <p:nvSpPr>
+            <p:cNvPr id="31" name="文本框 30">
+              <a:extLst>
+                <a:ext uri="{FF2B5EF4-FFF2-40B4-BE49-F238E27FC236}">
+                  <a16:creationId xmlns:a16="http://schemas.microsoft.com/office/drawing/2014/main" id="{6EFC7775-AA5E-4438-837C-8F6D532AFA29}"/>
+                </a:ext>
+              </a:extLst>
+            </p:cNvPr>
+            <p:cNvSpPr txBox="1"/>
+            <p:nvPr/>
+          </p:nvSpPr>
+          <p:spPr>
+            <a:xfrm>
+              <a:off x="6391923" y="1017384"/>
+              <a:ext cx="1087260" cy="944923"/>
+            </a:xfrm>
+            <a:prstGeom prst="rect">
+              <a:avLst/>
+            </a:prstGeom>
+            <a:noFill/>
+            <a:ln w="9525">
+              <a:noFill/>
+            </a:ln>
+          </p:spPr>
+          <p:txBody>
+            <a:bodyPr wrap="square" rtlCol="0">
+              <a:spAutoFit/>
+            </a:bodyPr>
+            <a:lstStyle/>
+            <a:p>
+              <a:r>
+                <a:rPr lang="zh-CN" altLang="en-US" sz="1000" dirty="0">
+                  <a:solidFill>
+                    <a:schemeClr val="bg2">
+                      <a:lumMod val="90000"/>
+                    </a:schemeClr>
+                  </a:solidFill>
+                </a:rPr>
+                <a:t>修改继承，引入 </a:t>
+              </a:r>
+              <a:r>
+                <a:rPr lang="en-US" altLang="zh-CN" sz="1000" dirty="0">
+                  <a:solidFill>
+                    <a:schemeClr val="bg2">
+                      <a:lumMod val="90000"/>
+                    </a:schemeClr>
+                  </a:solidFill>
+                </a:rPr>
+                <a:t>FactoryBean</a:t>
+              </a:r>
+              <a:br>
+                <a:rPr lang="en-US" altLang="zh-CN" sz="1000" dirty="0">
+                  <a:solidFill>
+                    <a:schemeClr val="bg2">
+                      <a:lumMod val="90000"/>
+                    </a:schemeClr>
+                  </a:solidFill>
+                </a:rPr>
+              </a:br>
+              <a:r>
+                <a:rPr lang="zh-CN" altLang="en-US" sz="1000" dirty="0">
+                  <a:solidFill>
+                    <a:schemeClr val="bg2">
+                      <a:lumMod val="90000"/>
+                    </a:schemeClr>
+                  </a:solidFill>
+                </a:rPr>
+                <a:t>对 </a:t>
+              </a:r>
+              <a:r>
+                <a:rPr lang="en-US" altLang="zh-CN" sz="1000" dirty="0">
+                  <a:solidFill>
+                    <a:schemeClr val="bg2">
+                      <a:lumMod val="90000"/>
+                    </a:schemeClr>
+                  </a:solidFill>
+                </a:rPr>
+                <a:t>Bean </a:t>
+              </a:r>
+              <a:r>
+                <a:rPr lang="zh-CN" altLang="en-US" sz="1000" dirty="0">
+                  <a:solidFill>
+                    <a:schemeClr val="bg2">
+                      <a:lumMod val="90000"/>
+                    </a:schemeClr>
+                  </a:solidFill>
+                </a:rPr>
+                <a:t>的创建流程进行修改</a:t>
+              </a:r>
+            </a:p>
+          </p:txBody>
+        </p:sp>
+      </p:grpSp>
+      <p:grpSp>
+        <p:nvGrpSpPr>
+          <p:cNvPr id="33" name="组合 32">
+            <a:extLst>
+              <a:ext uri="{FF2B5EF4-FFF2-40B4-BE49-F238E27FC236}">
+                <a16:creationId xmlns:a16="http://schemas.microsoft.com/office/drawing/2014/main" id="{B054D41D-3BF8-4B55-9247-DB0D52793D80}"/>
+              </a:ext>
+            </a:extLst>
+          </p:cNvPr>
+          <p:cNvGrpSpPr/>
+          <p:nvPr/>
+        </p:nvGrpSpPr>
+        <p:grpSpPr>
+          <a:xfrm>
+            <a:off x="5400673" y="5715000"/>
+            <a:ext cx="1771649" cy="425664"/>
+            <a:chOff x="5812039" y="1043610"/>
+            <a:chExt cx="2762964" cy="936125"/>
+          </a:xfrm>
+        </p:grpSpPr>
+        <p:sp>
+          <p:nvSpPr>
+            <p:cNvPr id="34" name="矩形 33">
+              <a:extLst>
+                <a:ext uri="{FF2B5EF4-FFF2-40B4-BE49-F238E27FC236}">
+                  <a16:creationId xmlns:a16="http://schemas.microsoft.com/office/drawing/2014/main" id="{7C403553-424F-4E20-BCB2-7074128C336F}"/>
+                </a:ext>
+              </a:extLst>
+            </p:cNvPr>
+            <p:cNvSpPr/>
+            <p:nvPr/>
+          </p:nvSpPr>
+          <p:spPr>
+            <a:xfrm>
+              <a:off x="5812039" y="1043610"/>
+              <a:ext cx="1667144" cy="892471"/>
+            </a:xfrm>
+            <a:prstGeom prst="rect">
+              <a:avLst/>
+            </a:prstGeom>
+            <a:noFill/>
+            <a:ln w="19050">
+              <a:solidFill>
+                <a:schemeClr val="tx1">
+                  <a:lumMod val="50000"/>
+                  <a:lumOff val="50000"/>
+                </a:schemeClr>
+              </a:solidFill>
+            </a:ln>
+          </p:spPr>
+          <p:style>
+            <a:lnRef idx="2">
+              <a:schemeClr val="accent1">
+                <a:shade val="50000"/>
+              </a:schemeClr>
+            </a:lnRef>
+            <a:fillRef idx="1">
+              <a:schemeClr val="accent1"/>
+            </a:fillRef>
+            <a:effectRef idx="0">
+              <a:schemeClr val="accent1"/>
+            </a:effectRef>
+            <a:fontRef idx="minor">
+              <a:schemeClr val="lt1"/>
+            </a:fontRef>
+          </p:style>
+          <p:txBody>
+            <a:bodyPr rtlCol="0" anchor="ctr"/>
+            <a:lstStyle/>
+            <a:p>
+              <a:pPr algn="ctr"/>
+              <a:endParaRPr lang="zh-CN" altLang="en-US" dirty="0"/>
+            </a:p>
+          </p:txBody>
+        </p:sp>
+        <p:sp>
+          <p:nvSpPr>
+            <p:cNvPr id="35" name="文本框 34">
+              <a:extLst>
+                <a:ext uri="{FF2B5EF4-FFF2-40B4-BE49-F238E27FC236}">
+                  <a16:creationId xmlns:a16="http://schemas.microsoft.com/office/drawing/2014/main" id="{6B0C4FB5-2349-4105-87CC-10F1F3469707}"/>
+                </a:ext>
+              </a:extLst>
+            </p:cNvPr>
+            <p:cNvSpPr txBox="1"/>
+            <p:nvPr/>
+          </p:nvSpPr>
+          <p:spPr>
+            <a:xfrm>
+              <a:off x="5812039" y="1438243"/>
+              <a:ext cx="2762964" cy="541492"/>
+            </a:xfrm>
+            <a:prstGeom prst="rect">
+              <a:avLst/>
+            </a:prstGeom>
+            <a:noFill/>
+            <a:ln w="9525">
+              <a:noFill/>
+            </a:ln>
+          </p:spPr>
+          <p:txBody>
+            <a:bodyPr wrap="square" rtlCol="0">
+              <a:spAutoFit/>
+            </a:bodyPr>
+            <a:lstStyle/>
+            <a:p>
+              <a:r>
+                <a:rPr lang="zh-CN" altLang="en-US" sz="1000" dirty="0">
+                  <a:solidFill>
+                    <a:schemeClr val="bg2">
+                      <a:lumMod val="90000"/>
+                    </a:schemeClr>
+                  </a:solidFill>
+                </a:rPr>
+                <a:t>引入对 </a:t>
+              </a:r>
+              <a:r>
+                <a:rPr lang="en-US" altLang="zh-CN" sz="1000" dirty="0">
+                  <a:solidFill>
+                    <a:schemeClr val="bg2">
+                      <a:lumMod val="90000"/>
+                    </a:schemeClr>
+                  </a:solidFill>
+                </a:rPr>
+                <a:t>FactoryBean </a:t>
+              </a:r>
+              <a:r>
+                <a:rPr lang="zh-CN" altLang="en-US" sz="1000" dirty="0">
+                  <a:solidFill>
+                    <a:schemeClr val="bg2">
+                      <a:lumMod val="90000"/>
+                    </a:schemeClr>
+                  </a:solidFill>
+                </a:rPr>
+                <a:t>的支持</a:t>
+              </a:r>
+            </a:p>
+          </p:txBody>
+        </p:sp>
+      </p:grpSp>
+    </p:spTree>
+    <p:extLst>
+      <p:ext uri="{BB962C8B-B14F-4D97-AF65-F5344CB8AC3E}">
+        <p14:creationId xmlns:p14="http://schemas.microsoft.com/office/powerpoint/2010/main" val="2883772903"/>
+      </p:ext>
+    </p:extLst>
+  </p:cSld>
+  <p:clrMapOvr>
+    <a:masterClrMapping/>
+  </p:clrMapOvr>
+</p:sld>
+</file>
+
 <file path=ppt/theme/theme1.xml><?xml version="1.0" encoding="utf-8"?>
 <a:theme xmlns:a="http://schemas.openxmlformats.org/drawingml/2006/main" name="Office 主题​​">
   <a:themeElements>

</xml_diff>